<commit_message>
take video of training
</commit_message>
<xml_diff>
--- a/Farm Management Information System (FMIS) Training.pptx
+++ b/Farm Management Information System (FMIS) Training.pptx
@@ -312,7 +312,7 @@
           <a:p>
             <a:fld id="{EF34FEBE-B979-4F83-ACF6-04056282710F}" type="datetimeFigureOut">
               <a:rPr lang="en-US" smtClean="0"/>
-              <a:t>8/25/2023</a:t>
+              <a:t>8/27/2023</a:t>
             </a:fld>
             <a:endParaRPr lang="en-US"/>
           </a:p>
@@ -650,7 +650,7 @@
           <a:p>
             <a:fld id="{EF34FEBE-B979-4F83-ACF6-04056282710F}" type="datetimeFigureOut">
               <a:rPr lang="en-US" smtClean="0"/>
-              <a:t>8/25/2023</a:t>
+              <a:t>8/27/2023</a:t>
             </a:fld>
             <a:endParaRPr lang="en-US"/>
           </a:p>
@@ -1051,7 +1051,7 @@
           <a:p>
             <a:fld id="{EF34FEBE-B979-4F83-ACF6-04056282710F}" type="datetimeFigureOut">
               <a:rPr lang="en-US" smtClean="0"/>
-              <a:t>8/25/2023</a:t>
+              <a:t>8/27/2023</a:t>
             </a:fld>
             <a:endParaRPr lang="en-US"/>
           </a:p>
@@ -1387,7 +1387,7 @@
           <a:p>
             <a:fld id="{EF34FEBE-B979-4F83-ACF6-04056282710F}" type="datetimeFigureOut">
               <a:rPr lang="en-US" smtClean="0"/>
-              <a:t>8/25/2023</a:t>
+              <a:t>8/27/2023</a:t>
             </a:fld>
             <a:endParaRPr lang="en-US"/>
           </a:p>
@@ -1707,7 +1707,7 @@
           <a:p>
             <a:fld id="{EF34FEBE-B979-4F83-ACF6-04056282710F}" type="datetimeFigureOut">
               <a:rPr lang="en-US" smtClean="0"/>
-              <a:t>8/25/2023</a:t>
+              <a:t>8/27/2023</a:t>
             </a:fld>
             <a:endParaRPr lang="en-US"/>
           </a:p>
@@ -2103,7 +2103,7 @@
           <a:p>
             <a:fld id="{EF34FEBE-B979-4F83-ACF6-04056282710F}" type="datetimeFigureOut">
               <a:rPr lang="en-US" smtClean="0"/>
-              <a:t>8/25/2023</a:t>
+              <a:t>8/27/2023</a:t>
             </a:fld>
             <a:endParaRPr lang="en-US"/>
           </a:p>
@@ -2360,7 +2360,7 @@
           <a:p>
             <a:fld id="{EF34FEBE-B979-4F83-ACF6-04056282710F}" type="datetimeFigureOut">
               <a:rPr lang="en-US" smtClean="0"/>
-              <a:t>8/25/2023</a:t>
+              <a:t>8/27/2023</a:t>
             </a:fld>
             <a:endParaRPr lang="en-US"/>
           </a:p>
@@ -2622,7 +2622,7 @@
           <a:p>
             <a:fld id="{EF34FEBE-B979-4F83-ACF6-04056282710F}" type="datetimeFigureOut">
               <a:rPr lang="en-US" smtClean="0"/>
-              <a:t>8/25/2023</a:t>
+              <a:t>8/27/2023</a:t>
             </a:fld>
             <a:endParaRPr lang="en-US"/>
           </a:p>
@@ -2884,7 +2884,7 @@
           <a:p>
             <a:fld id="{EF34FEBE-B979-4F83-ACF6-04056282710F}" type="datetimeFigureOut">
               <a:rPr lang="en-US" smtClean="0"/>
-              <a:t>8/25/2023</a:t>
+              <a:t>8/27/2023</a:t>
             </a:fld>
             <a:endParaRPr lang="en-US"/>
           </a:p>
@@ -3213,7 +3213,7 @@
           <a:p>
             <a:fld id="{EF34FEBE-B979-4F83-ACF6-04056282710F}" type="datetimeFigureOut">
               <a:rPr lang="en-US" smtClean="0"/>
-              <a:t>8/25/2023</a:t>
+              <a:t>8/27/2023</a:t>
             </a:fld>
             <a:endParaRPr lang="en-US"/>
           </a:p>
@@ -3536,7 +3536,7 @@
           <a:p>
             <a:fld id="{EF34FEBE-B979-4F83-ACF6-04056282710F}" type="datetimeFigureOut">
               <a:rPr lang="en-US" smtClean="0"/>
-              <a:t>8/25/2023</a:t>
+              <a:t>8/27/2023</a:t>
             </a:fld>
             <a:endParaRPr lang="en-US"/>
           </a:p>
@@ -3993,7 +3993,7 @@
           <a:p>
             <a:fld id="{EF34FEBE-B979-4F83-ACF6-04056282710F}" type="datetimeFigureOut">
               <a:rPr lang="en-US" smtClean="0"/>
-              <a:t>8/25/2023</a:t>
+              <a:t>8/27/2023</a:t>
             </a:fld>
             <a:endParaRPr lang="en-US"/>
           </a:p>
@@ -4198,7 +4198,7 @@
           <a:p>
             <a:fld id="{EF34FEBE-B979-4F83-ACF6-04056282710F}" type="datetimeFigureOut">
               <a:rPr lang="en-US" smtClean="0"/>
-              <a:t>8/25/2023</a:t>
+              <a:t>8/27/2023</a:t>
             </a:fld>
             <a:endParaRPr lang="en-US"/>
           </a:p>
@@ -4375,7 +4375,7 @@
           <a:p>
             <a:fld id="{EF34FEBE-B979-4F83-ACF6-04056282710F}" type="datetimeFigureOut">
               <a:rPr lang="en-US" smtClean="0"/>
-              <a:t>8/25/2023</a:t>
+              <a:t>8/27/2023</a:t>
             </a:fld>
             <a:endParaRPr lang="en-US"/>
           </a:p>
@@ -4708,7 +4708,7 @@
           <a:p>
             <a:fld id="{EF34FEBE-B979-4F83-ACF6-04056282710F}" type="datetimeFigureOut">
               <a:rPr lang="en-US" smtClean="0"/>
-              <a:t>8/25/2023</a:t>
+              <a:t>8/27/2023</a:t>
             </a:fld>
             <a:endParaRPr lang="en-US"/>
           </a:p>
@@ -5053,7 +5053,7 @@
           <a:p>
             <a:fld id="{EF34FEBE-B979-4F83-ACF6-04056282710F}" type="datetimeFigureOut">
               <a:rPr lang="en-US" smtClean="0"/>
-              <a:t>8/25/2023</a:t>
+              <a:t>8/27/2023</a:t>
             </a:fld>
             <a:endParaRPr lang="en-US"/>
           </a:p>
@@ -7170,7 +7170,7 @@
           <a:p>
             <a:fld id="{EF34FEBE-B979-4F83-ACF6-04056282710F}" type="datetimeFigureOut">
               <a:rPr lang="en-US" smtClean="0"/>
-              <a:t>8/25/2023</a:t>
+              <a:t>8/27/2023</a:t>
             </a:fld>
             <a:endParaRPr lang="en-US"/>
           </a:p>
@@ -9049,13 +9049,8 @@
           <a:p>
             <a:r>
               <a:rPr lang="en-US" dirty="0"/>
-              <a:t>Paste the pictures into a folder and name it </a:t>
-            </a:r>
-            <a:r>
-              <a:rPr lang="en-US" dirty="0" err="1"/>
-              <a:t>approriately</a:t>
-            </a:r>
-            <a:endParaRPr lang="en-US" dirty="0"/>
+              <a:t>Paste the pictures into a folder and name it appropriately</a:t>
+            </a:r>
           </a:p>
         </p:txBody>
       </p:sp>

</xml_diff>